<commit_message>
Finishedgit add .git add .
</commit_message>
<xml_diff>
--- a/MASTERMIND.pptx
+++ b/MASTERMIND.pptx
@@ -6,10 +6,12 @@
   </p:sldMasterIdLst>
   <p:sldIdLst>
     <p:sldId id="256" r:id="rId2"/>
-    <p:sldId id="257" r:id="rId3"/>
-    <p:sldId id="258" r:id="rId4"/>
-    <p:sldId id="259" r:id="rId5"/>
-    <p:sldId id="260" r:id="rId6"/>
+    <p:sldId id="262" r:id="rId3"/>
+    <p:sldId id="257" r:id="rId4"/>
+    <p:sldId id="258" r:id="rId5"/>
+    <p:sldId id="259" r:id="rId6"/>
+    <p:sldId id="260" r:id="rId7"/>
+    <p:sldId id="261" r:id="rId8"/>
   </p:sldIdLst>
   <p:sldSz cx="12192000" cy="6858000"/>
   <p:notesSz cx="6858000" cy="9144000"/>
@@ -108,6 +110,11 @@
       </a:defRPr>
     </a:lvl9pPr>
   </p:defaultTextStyle>
+  <p:extLst>
+    <p:ext uri="{EFAFB233-063F-42B5-8137-9DF3F51BA10A}">
+      <p15:sldGuideLst xmlns:p15="http://schemas.microsoft.com/office/powerpoint/2012/main"/>
+    </p:ext>
+  </p:extLst>
 </p:presentation>
 </file>
 
@@ -267,7 +274,7 @@
           <a:p>
             <a:fld id="{02AC24A9-CCB6-4F8D-B8DB-C2F3692CFA5A}" type="datetimeFigureOut">
               <a:rPr lang="en-US" smtClean="0"/>
-              <a:t>6/23/2024</a:t>
+              <a:t>6/25/2024</a:t>
             </a:fld>
             <a:endParaRPr lang="en-US" dirty="0"/>
           </a:p>
@@ -637,7 +644,7 @@
           <a:p>
             <a:fld id="{02AC24A9-CCB6-4F8D-B8DB-C2F3692CFA5A}" type="datetimeFigureOut">
               <a:rPr lang="en-US" smtClean="0"/>
-              <a:t>6/23/2024</a:t>
+              <a:t>6/25/2024</a:t>
             </a:fld>
             <a:endParaRPr lang="en-US"/>
           </a:p>
@@ -846,7 +853,7 @@
           <a:p>
             <a:fld id="{02AC24A9-CCB6-4F8D-B8DB-C2F3692CFA5A}" type="datetimeFigureOut">
               <a:rPr lang="en-US" smtClean="0"/>
-              <a:t>6/23/2024</a:t>
+              <a:t>6/25/2024</a:t>
             </a:fld>
             <a:endParaRPr lang="en-US"/>
           </a:p>
@@ -1316,7 +1323,7 @@
           <a:p>
             <a:fld id="{02AC24A9-CCB6-4F8D-B8DB-C2F3692CFA5A}" type="datetimeFigureOut">
               <a:rPr lang="en-US" smtClean="0"/>
-              <a:t>6/23/2024</a:t>
+              <a:t>6/25/2024</a:t>
             </a:fld>
             <a:endParaRPr lang="en-US"/>
           </a:p>
@@ -1770,7 +1777,7 @@
           <a:p>
             <a:fld id="{02AC24A9-CCB6-4F8D-B8DB-C2F3692CFA5A}" type="datetimeFigureOut">
               <a:rPr lang="en-US" smtClean="0"/>
-              <a:t>6/23/2024</a:t>
+              <a:t>6/25/2024</a:t>
             </a:fld>
             <a:endParaRPr lang="en-US"/>
           </a:p>
@@ -2302,7 +2309,7 @@
           <a:p>
             <a:fld id="{02AC24A9-CCB6-4F8D-B8DB-C2F3692CFA5A}" type="datetimeFigureOut">
               <a:rPr lang="en-US" smtClean="0"/>
-              <a:t>6/23/2024</a:t>
+              <a:t>6/25/2024</a:t>
             </a:fld>
             <a:endParaRPr lang="en-US"/>
           </a:p>
@@ -3001,7 +3008,7 @@
           <a:p>
             <a:fld id="{02AC24A9-CCB6-4F8D-B8DB-C2F3692CFA5A}" type="datetimeFigureOut">
               <a:rPr lang="en-US" smtClean="0"/>
-              <a:t>6/23/2024</a:t>
+              <a:t>6/25/2024</a:t>
             </a:fld>
             <a:endParaRPr lang="en-US"/>
           </a:p>
@@ -3330,7 +3337,7 @@
           <a:p>
             <a:fld id="{02AC24A9-CCB6-4F8D-B8DB-C2F3692CFA5A}" type="datetimeFigureOut">
               <a:rPr lang="en-US" smtClean="0"/>
-              <a:t>6/23/2024</a:t>
+              <a:t>6/25/2024</a:t>
             </a:fld>
             <a:endParaRPr lang="en-US"/>
           </a:p>
@@ -3443,7 +3450,7 @@
           <a:p>
             <a:fld id="{02AC24A9-CCB6-4F8D-B8DB-C2F3692CFA5A}" type="datetimeFigureOut">
               <a:rPr lang="en-US" smtClean="0"/>
-              <a:t>6/23/2024</a:t>
+              <a:t>6/25/2024</a:t>
             </a:fld>
             <a:endParaRPr lang="en-US"/>
           </a:p>
@@ -3938,7 +3945,7 @@
           <a:p>
             <a:fld id="{02AC24A9-CCB6-4F8D-B8DB-C2F3692CFA5A}" type="datetimeFigureOut">
               <a:rPr lang="en-US" smtClean="0"/>
-              <a:t>6/23/2024</a:t>
+              <a:t>6/25/2024</a:t>
             </a:fld>
             <a:endParaRPr lang="en-US" dirty="0"/>
           </a:p>
@@ -4415,7 +4422,7 @@
           <a:p>
             <a:fld id="{02AC24A9-CCB6-4F8D-B8DB-C2F3692CFA5A}" type="datetimeFigureOut">
               <a:rPr lang="en-US" smtClean="0"/>
-              <a:t>6/23/2024</a:t>
+              <a:t>6/25/2024</a:t>
             </a:fld>
             <a:endParaRPr lang="en-US"/>
           </a:p>
@@ -4658,7 +4665,7 @@
           <a:p>
             <a:fld id="{02AC24A9-CCB6-4F8D-B8DB-C2F3692CFA5A}" type="datetimeFigureOut">
               <a:rPr lang="en-US" smtClean="0"/>
-              <a:t>6/23/2024</a:t>
+              <a:t>6/25/2024</a:t>
             </a:fld>
             <a:endParaRPr lang="en-US"/>
           </a:p>
@@ -5561,7 +5568,7 @@
           <p:cNvPr id="2" name="Title 1">
             <a:extLst>
               <a:ext uri="{FF2B5EF4-FFF2-40B4-BE49-F238E27FC236}">
-                <a16:creationId xmlns:a16="http://schemas.microsoft.com/office/drawing/2014/main" id="{8C366B8B-7213-7BE4-F48C-C8FE142563CE}"/>
+                <a16:creationId xmlns:a16="http://schemas.microsoft.com/office/drawing/2014/main" id="{F5A0D428-89E3-15E4-85EB-CA722EC859C2}"/>
               </a:ext>
             </a:extLst>
           </p:cNvPr>
@@ -5579,8 +5586,15 @@
           <a:p>
             <a:r>
               <a:rPr lang="en-NZ" dirty="0"/>
-              <a:t>Why Mastermind?</a:t>
-            </a:r>
+              <a:t>Project Vid </a:t>
+            </a:r>
+            <a:r>
+              <a:rPr lang="en-NZ" dirty="0">
+                <a:sym typeface="Wingdings" panose="05000000000000000000" pitchFamily="2" charset="2"/>
+              </a:rPr>
+              <a:t></a:t>
+            </a:r>
+            <a:endParaRPr lang="en-NZ" dirty="0"/>
           </a:p>
         </p:txBody>
       </p:sp>
@@ -5589,7 +5603,7 @@
           <p:cNvPr id="3" name="Content Placeholder 2">
             <a:extLst>
               <a:ext uri="{FF2B5EF4-FFF2-40B4-BE49-F238E27FC236}">
-                <a16:creationId xmlns:a16="http://schemas.microsoft.com/office/drawing/2014/main" id="{AF482469-F3C6-219F-4EF4-107F9FD3EA26}"/>
+                <a16:creationId xmlns:a16="http://schemas.microsoft.com/office/drawing/2014/main" id="{E804AFC2-5B80-A7A0-CB05-815D1B8F511A}"/>
               </a:ext>
             </a:extLst>
           </p:cNvPr>
@@ -5605,29 +5619,14 @@
           <a:bodyPr/>
           <a:lstStyle/>
           <a:p>
-            <a:r>
-              <a:rPr lang="en-NZ" dirty="0"/>
-              <a:t>Mastermind takes aspects of Wordle but with Colours</a:t>
-            </a:r>
-          </a:p>
-          <a:p>
-            <a:r>
-              <a:rPr lang="en-NZ" dirty="0"/>
-              <a:t>Since these Games are popular now this was a good idea to try</a:t>
-            </a:r>
-          </a:p>
-          <a:p>
-            <a:r>
-              <a:rPr lang="en-NZ" dirty="0"/>
-              <a:t>Decided 2 Arduinos make this more reliable so made it a group project.</a:t>
-            </a:r>
+            <a:endParaRPr lang="en-NZ" dirty="0"/>
           </a:p>
         </p:txBody>
       </p:sp>
     </p:spTree>
     <p:extLst>
       <p:ext uri="{BB962C8B-B14F-4D97-AF65-F5344CB8AC3E}">
-        <p14:creationId xmlns:p14="http://schemas.microsoft.com/office/powerpoint/2010/main" val="2338504210"/>
+        <p14:creationId xmlns:p14="http://schemas.microsoft.com/office/powerpoint/2010/main" val="2196959912"/>
       </p:ext>
     </p:extLst>
   </p:cSld>
@@ -5659,7 +5658,7 @@
           <p:cNvPr id="2" name="Title 1">
             <a:extLst>
               <a:ext uri="{FF2B5EF4-FFF2-40B4-BE49-F238E27FC236}">
-                <a16:creationId xmlns:a16="http://schemas.microsoft.com/office/drawing/2014/main" id="{093FE3AD-B744-09C8-A1D4-CD2865A8B4C1}"/>
+                <a16:creationId xmlns:a16="http://schemas.microsoft.com/office/drawing/2014/main" id="{8C366B8B-7213-7BE4-F48C-C8FE142563CE}"/>
               </a:ext>
             </a:extLst>
           </p:cNvPr>
@@ -5677,7 +5676,7 @@
           <a:p>
             <a:r>
               <a:rPr lang="en-NZ" dirty="0"/>
-              <a:t>Problems and Scope</a:t>
+              <a:t>Why Mastermind?</a:t>
             </a:r>
           </a:p>
         </p:txBody>
@@ -5687,7 +5686,7 @@
           <p:cNvPr id="3" name="Content Placeholder 2">
             <a:extLst>
               <a:ext uri="{FF2B5EF4-FFF2-40B4-BE49-F238E27FC236}">
-                <a16:creationId xmlns:a16="http://schemas.microsoft.com/office/drawing/2014/main" id="{3B3FCF72-54EB-1581-ADBD-3C90B2ED03BD}"/>
+                <a16:creationId xmlns:a16="http://schemas.microsoft.com/office/drawing/2014/main" id="{AF482469-F3C6-219F-4EF4-107F9FD3EA26}"/>
               </a:ext>
             </a:extLst>
           </p:cNvPr>
@@ -5705,30 +5704,27 @@
           <a:p>
             <a:r>
               <a:rPr lang="en-NZ" dirty="0"/>
-              <a:t>Figured out early that my scope would be too big so 2 Arduinos would make life much easier</a:t>
+              <a:t>Mastermind takes aspects of Wordle but with Colours</a:t>
             </a:r>
           </a:p>
           <a:p>
             <a:r>
               <a:rPr lang="en-NZ" dirty="0"/>
-              <a:t>This made the first problem with LEDs easier as now we had more ways to power them all</a:t>
+              <a:t>Since these Games are popular now this was a good idea to try</a:t>
             </a:r>
           </a:p>
           <a:p>
             <a:r>
               <a:rPr lang="en-NZ" dirty="0"/>
-              <a:t>3d Printing was a big problem after all the iterations, and maintenance the printers had</a:t>
-            </a:r>
-          </a:p>
-          <a:p>
-            <a:endParaRPr lang="en-NZ" dirty="0"/>
+              <a:t>Decided 2 Arduinos make this more reliable so made it a group project.</a:t>
+            </a:r>
           </a:p>
         </p:txBody>
       </p:sp>
     </p:spTree>
     <p:extLst>
       <p:ext uri="{BB962C8B-B14F-4D97-AF65-F5344CB8AC3E}">
-        <p14:creationId xmlns:p14="http://schemas.microsoft.com/office/powerpoint/2010/main" val="3817227579"/>
+        <p14:creationId xmlns:p14="http://schemas.microsoft.com/office/powerpoint/2010/main" val="2338504210"/>
       </p:ext>
     </p:extLst>
   </p:cSld>
@@ -5760,7 +5756,7 @@
           <p:cNvPr id="2" name="Title 1">
             <a:extLst>
               <a:ext uri="{FF2B5EF4-FFF2-40B4-BE49-F238E27FC236}">
-                <a16:creationId xmlns:a16="http://schemas.microsoft.com/office/drawing/2014/main" id="{B166C887-F32E-7152-4F89-8D38F57F9E53}"/>
+                <a16:creationId xmlns:a16="http://schemas.microsoft.com/office/drawing/2014/main" id="{093FE3AD-B744-09C8-A1D4-CD2865A8B4C1}"/>
               </a:ext>
             </a:extLst>
           </p:cNvPr>
@@ -5778,7 +5774,7 @@
           <a:p>
             <a:r>
               <a:rPr lang="en-NZ" dirty="0"/>
-              <a:t>Hardware</a:t>
+              <a:t>Problems and Scope</a:t>
             </a:r>
           </a:p>
         </p:txBody>
@@ -5788,7 +5784,7 @@
           <p:cNvPr id="3" name="Content Placeholder 2">
             <a:extLst>
               <a:ext uri="{FF2B5EF4-FFF2-40B4-BE49-F238E27FC236}">
-                <a16:creationId xmlns:a16="http://schemas.microsoft.com/office/drawing/2014/main" id="{FFAB4D30-F692-5A4D-B2F5-DF83E5CB8E1A}"/>
+                <a16:creationId xmlns:a16="http://schemas.microsoft.com/office/drawing/2014/main" id="{3B3FCF72-54EB-1581-ADBD-3C90B2ED03BD}"/>
               </a:ext>
             </a:extLst>
           </p:cNvPr>
@@ -5806,27 +5802,24 @@
           <a:p>
             <a:r>
               <a:rPr lang="en-NZ" dirty="0"/>
-              <a:t>1x4 led strip. 4x6 led strips. This is to display the colours for the mastermind and the player playing.</a:t>
+              <a:t>Figured out early that my scope would be too big so 2 Arduinos would make life much easier</a:t>
             </a:r>
           </a:p>
           <a:p>
             <a:r>
               <a:rPr lang="en-NZ" dirty="0"/>
-              <a:t>Power supply to power the game away from the computer</a:t>
-            </a:r>
-          </a:p>
-          <a:p>
-            <a:r>
-              <a:rPr lang="en-NZ" dirty="0"/>
-              <a:t>3D PRINT THAT COULD BE DONE WHEN PRESENTING</a:t>
-            </a:r>
+              <a:t>3d Printing is a big problem after all the iterations, and maintenance the printers had</a:t>
+            </a:r>
+          </a:p>
+          <a:p>
+            <a:endParaRPr lang="en-NZ" dirty="0"/>
           </a:p>
         </p:txBody>
       </p:sp>
     </p:spTree>
     <p:extLst>
       <p:ext uri="{BB962C8B-B14F-4D97-AF65-F5344CB8AC3E}">
-        <p14:creationId xmlns:p14="http://schemas.microsoft.com/office/powerpoint/2010/main" val="1724069176"/>
+        <p14:creationId xmlns:p14="http://schemas.microsoft.com/office/powerpoint/2010/main" val="3817227579"/>
       </p:ext>
     </p:extLst>
   </p:cSld>
@@ -5858,6 +5851,98 @@
           <p:cNvPr id="2" name="Title 1">
             <a:extLst>
               <a:ext uri="{FF2B5EF4-FFF2-40B4-BE49-F238E27FC236}">
+                <a16:creationId xmlns:a16="http://schemas.microsoft.com/office/drawing/2014/main" id="{B166C887-F32E-7152-4F89-8D38F57F9E53}"/>
+              </a:ext>
+            </a:extLst>
+          </p:cNvPr>
+          <p:cNvSpPr>
+            <a:spLocks noGrp="1"/>
+          </p:cNvSpPr>
+          <p:nvPr>
+            <p:ph type="title"/>
+          </p:nvPr>
+        </p:nvSpPr>
+        <p:spPr/>
+        <p:txBody>
+          <a:bodyPr/>
+          <a:lstStyle/>
+          <a:p>
+            <a:r>
+              <a:rPr lang="en-NZ" dirty="0"/>
+              <a:t>Hardware</a:t>
+            </a:r>
+          </a:p>
+        </p:txBody>
+      </p:sp>
+      <p:sp>
+        <p:nvSpPr>
+          <p:cNvPr id="3" name="Content Placeholder 2">
+            <a:extLst>
+              <a:ext uri="{FF2B5EF4-FFF2-40B4-BE49-F238E27FC236}">
+                <a16:creationId xmlns:a16="http://schemas.microsoft.com/office/drawing/2014/main" id="{FFAB4D30-F692-5A4D-B2F5-DF83E5CB8E1A}"/>
+              </a:ext>
+            </a:extLst>
+          </p:cNvPr>
+          <p:cNvSpPr>
+            <a:spLocks noGrp="1"/>
+          </p:cNvSpPr>
+          <p:nvPr>
+            <p:ph idx="1"/>
+          </p:nvPr>
+        </p:nvSpPr>
+        <p:spPr/>
+        <p:txBody>
+          <a:bodyPr/>
+          <a:lstStyle/>
+          <a:p>
+            <a:r>
+              <a:rPr lang="en-NZ" dirty="0"/>
+              <a:t>1x4 led strip. 4x6 led strips. This is to display the colours for the mastermind and the player playing.</a:t>
+            </a:r>
+          </a:p>
+          <a:p>
+            <a:r>
+              <a:rPr lang="en-NZ" dirty="0"/>
+              <a:t>Power supply to power the game away from the computer</a:t>
+            </a:r>
+          </a:p>
+        </p:txBody>
+      </p:sp>
+    </p:spTree>
+    <p:extLst>
+      <p:ext uri="{BB962C8B-B14F-4D97-AF65-F5344CB8AC3E}">
+        <p14:creationId xmlns:p14="http://schemas.microsoft.com/office/powerpoint/2010/main" val="1724069176"/>
+      </p:ext>
+    </p:extLst>
+  </p:cSld>
+  <p:clrMapOvr>
+    <a:masterClrMapping/>
+  </p:clrMapOvr>
+</p:sld>
+</file>
+
+<file path=ppt/slides/slide6.xml><?xml version="1.0" encoding="utf-8"?>
+<p:sld xmlns:a="http://schemas.openxmlformats.org/drawingml/2006/main" xmlns:r="http://schemas.openxmlformats.org/officeDocument/2006/relationships" xmlns:p="http://schemas.openxmlformats.org/presentationml/2006/main">
+  <p:cSld>
+    <p:spTree>
+      <p:nvGrpSpPr>
+        <p:cNvPr id="1" name=""/>
+        <p:cNvGrpSpPr/>
+        <p:nvPr/>
+      </p:nvGrpSpPr>
+      <p:grpSpPr>
+        <a:xfrm>
+          <a:off x="0" y="0"/>
+          <a:ext cx="0" cy="0"/>
+          <a:chOff x="0" y="0"/>
+          <a:chExt cx="0" cy="0"/>
+        </a:xfrm>
+      </p:grpSpPr>
+      <p:sp>
+        <p:nvSpPr>
+          <p:cNvPr id="2" name="Title 1">
+            <a:extLst>
+              <a:ext uri="{FF2B5EF4-FFF2-40B4-BE49-F238E27FC236}">
                 <a16:creationId xmlns:a16="http://schemas.microsoft.com/office/drawing/2014/main" id="{3991D9DD-32BB-8CEC-A84B-16CE040D4BDE}"/>
               </a:ext>
             </a:extLst>
@@ -5925,6 +6010,101 @@
     <p:extLst>
       <p:ext uri="{BB962C8B-B14F-4D97-AF65-F5344CB8AC3E}">
         <p14:creationId xmlns:p14="http://schemas.microsoft.com/office/powerpoint/2010/main" val="2386991878"/>
+      </p:ext>
+    </p:extLst>
+  </p:cSld>
+  <p:clrMapOvr>
+    <a:masterClrMapping/>
+  </p:clrMapOvr>
+</p:sld>
+</file>
+
+<file path=ppt/slides/slide7.xml><?xml version="1.0" encoding="utf-8"?>
+<p:sld xmlns:a="http://schemas.openxmlformats.org/drawingml/2006/main" xmlns:r="http://schemas.openxmlformats.org/officeDocument/2006/relationships" xmlns:p="http://schemas.openxmlformats.org/presentationml/2006/main">
+  <p:cSld>
+    <p:spTree>
+      <p:nvGrpSpPr>
+        <p:cNvPr id="1" name=""/>
+        <p:cNvGrpSpPr/>
+        <p:nvPr/>
+      </p:nvGrpSpPr>
+      <p:grpSpPr>
+        <a:xfrm>
+          <a:off x="0" y="0"/>
+          <a:ext cx="0" cy="0"/>
+          <a:chOff x="0" y="0"/>
+          <a:chExt cx="0" cy="0"/>
+        </a:xfrm>
+      </p:grpSpPr>
+      <p:sp>
+        <p:nvSpPr>
+          <p:cNvPr id="2" name="Title 1">
+            <a:extLst>
+              <a:ext uri="{FF2B5EF4-FFF2-40B4-BE49-F238E27FC236}">
+                <a16:creationId xmlns:a16="http://schemas.microsoft.com/office/drawing/2014/main" id="{DAE8BF70-846C-D74D-587C-6445B4C8A7FB}"/>
+              </a:ext>
+            </a:extLst>
+          </p:cNvPr>
+          <p:cNvSpPr>
+            <a:spLocks noGrp="1"/>
+          </p:cNvSpPr>
+          <p:nvPr>
+            <p:ph type="title"/>
+          </p:nvPr>
+        </p:nvSpPr>
+        <p:spPr/>
+        <p:txBody>
+          <a:bodyPr/>
+          <a:lstStyle/>
+          <a:p>
+            <a:r>
+              <a:rPr lang="en-NZ" dirty="0"/>
+              <a:t>Things to know</a:t>
+            </a:r>
+          </a:p>
+        </p:txBody>
+      </p:sp>
+      <p:sp>
+        <p:nvSpPr>
+          <p:cNvPr id="3" name="Content Placeholder 2">
+            <a:extLst>
+              <a:ext uri="{FF2B5EF4-FFF2-40B4-BE49-F238E27FC236}">
+                <a16:creationId xmlns:a16="http://schemas.microsoft.com/office/drawing/2014/main" id="{6199349B-331E-899D-BD4F-EB9B55593BF1}"/>
+              </a:ext>
+            </a:extLst>
+          </p:cNvPr>
+          <p:cNvSpPr>
+            <a:spLocks noGrp="1"/>
+          </p:cNvSpPr>
+          <p:nvPr>
+            <p:ph idx="1"/>
+          </p:nvPr>
+        </p:nvSpPr>
+        <p:spPr/>
+        <p:txBody>
+          <a:bodyPr/>
+          <a:lstStyle/>
+          <a:p>
+            <a:r>
+              <a:rPr lang="en-NZ" dirty="0"/>
+              <a:t>At no point ask us to open it </a:t>
+            </a:r>
+          </a:p>
+          <a:p>
+            <a:r>
+              <a:rPr lang="en-NZ" dirty="0"/>
+              <a:t>*insert image of inside* JACKK!!!!</a:t>
+            </a:r>
+          </a:p>
+          <a:p>
+            <a:endParaRPr lang="en-NZ" dirty="0"/>
+          </a:p>
+        </p:txBody>
+      </p:sp>
+    </p:spTree>
+    <p:extLst>
+      <p:ext uri="{BB962C8B-B14F-4D97-AF65-F5344CB8AC3E}">
+        <p14:creationId xmlns:p14="http://schemas.microsoft.com/office/powerpoint/2010/main" val="752757479"/>
       </p:ext>
     </p:extLst>
   </p:cSld>

</xml_diff>

<commit_message>
update powerpoint with awesome photos
</commit_message>
<xml_diff>
--- a/MASTERMIND.pptx
+++ b/MASTERMIND.pptx
@@ -5737,6 +5737,14 @@
 <file path=ppt/slides/slide4.xml><?xml version="1.0" encoding="utf-8"?>
 <p:sld xmlns:a="http://schemas.openxmlformats.org/drawingml/2006/main" xmlns:r="http://schemas.openxmlformats.org/officeDocument/2006/relationships" xmlns:p="http://schemas.openxmlformats.org/presentationml/2006/main">
   <p:cSld>
+    <p:bg>
+      <p:bgPr>
+        <a:solidFill>
+          <a:schemeClr val="bg1"/>
+        </a:solidFill>
+        <a:effectLst/>
+      </p:bgPr>
+    </p:bg>
     <p:spTree>
       <p:nvGrpSpPr>
         <p:cNvPr id="1" name=""/>
@@ -5751,6 +5759,168 @@
           <a:chExt cx="0" cy="0"/>
         </a:xfrm>
       </p:grpSpPr>
+      <p:sp useBgFill="1">
+        <p:nvSpPr>
+          <p:cNvPr id="24" name="Rectangle 23">
+            <a:extLst>
+              <a:ext uri="{FF2B5EF4-FFF2-40B4-BE49-F238E27FC236}">
+                <a16:creationId xmlns:a16="http://schemas.microsoft.com/office/drawing/2014/main" id="{2C9A9DA9-7DC8-488B-A882-123947B0F3D9}"/>
+              </a:ext>
+              <a:ext uri="{C183D7F6-B498-43B3-948B-1728B52AA6E4}">
+                <adec:decorative xmlns:adec="http://schemas.microsoft.com/office/drawing/2017/decorative" val="1"/>
+              </a:ext>
+            </a:extLst>
+          </p:cNvPr>
+          <p:cNvSpPr>
+            <a:spLocks noGrp="1" noRot="1" noChangeAspect="1" noMove="1" noResize="1" noEditPoints="1" noAdjustHandles="1" noChangeArrowheads="1" noChangeShapeType="1" noTextEdit="1"/>
+          </p:cNvSpPr>
+          <p:nvPr>
+            <p:extLst>
+              <p:ext uri="{386F3935-93C4-4BCD-93E2-E3B085C9AB24}">
+                <p16:designElem xmlns:p16="http://schemas.microsoft.com/office/powerpoint/2015/main" val="1"/>
+              </p:ext>
+            </p:extLst>
+          </p:nvPr>
+        </p:nvSpPr>
+        <p:spPr>
+          <a:xfrm>
+            <a:off x="0" y="0"/>
+            <a:ext cx="12192000" cy="6858000"/>
+          </a:xfrm>
+          <a:prstGeom prst="rect">
+            <a:avLst/>
+          </a:prstGeom>
+          <a:ln>
+            <a:noFill/>
+          </a:ln>
+        </p:spPr>
+        <p:style>
+          <a:lnRef idx="2">
+            <a:schemeClr val="accent1">
+              <a:shade val="50000"/>
+            </a:schemeClr>
+          </a:lnRef>
+          <a:fillRef idx="1">
+            <a:schemeClr val="accent1"/>
+          </a:fillRef>
+          <a:effectRef idx="0">
+            <a:schemeClr val="accent1"/>
+          </a:effectRef>
+          <a:fontRef idx="minor">
+            <a:schemeClr val="lt1"/>
+          </a:fontRef>
+        </p:style>
+        <p:txBody>
+          <a:bodyPr rtlCol="0" anchor="ctr"/>
+          <a:lstStyle/>
+          <a:p>
+            <a:pPr algn="ctr"/>
+            <a:endParaRPr lang="en-US"/>
+          </a:p>
+        </p:txBody>
+      </p:sp>
+      <p:sp useBgFill="1">
+        <p:nvSpPr>
+          <p:cNvPr id="26" name="Rectangle 25">
+            <a:extLst>
+              <a:ext uri="{FF2B5EF4-FFF2-40B4-BE49-F238E27FC236}">
+                <a16:creationId xmlns:a16="http://schemas.microsoft.com/office/drawing/2014/main" id="{57F6BDD4-E066-4008-8011-6CC31AEB4556}"/>
+              </a:ext>
+              <a:ext uri="{C183D7F6-B498-43B3-948B-1728B52AA6E4}">
+                <adec:decorative xmlns:adec="http://schemas.microsoft.com/office/drawing/2017/decorative" val="1"/>
+              </a:ext>
+            </a:extLst>
+          </p:cNvPr>
+          <p:cNvSpPr>
+            <a:spLocks noGrp="1" noRot="1" noChangeAspect="1" noMove="1" noResize="1" noEditPoints="1" noAdjustHandles="1" noChangeArrowheads="1" noChangeShapeType="1" noTextEdit="1"/>
+          </p:cNvSpPr>
+          <p:nvPr>
+            <p:extLst>
+              <p:ext uri="{386F3935-93C4-4BCD-93E2-E3B085C9AB24}">
+                <p16:designElem xmlns:p16="http://schemas.microsoft.com/office/powerpoint/2015/main" val="1"/>
+              </p:ext>
+            </p:extLst>
+          </p:nvPr>
+        </p:nvSpPr>
+        <p:spPr>
+          <a:xfrm>
+            <a:off x="409575" y="633619"/>
+            <a:ext cx="6838569" cy="5495925"/>
+          </a:xfrm>
+          <a:prstGeom prst="rect">
+            <a:avLst/>
+          </a:prstGeom>
+          <a:ln w="9525">
+            <a:solidFill>
+              <a:schemeClr val="tx2">
+                <a:lumMod val="10000"/>
+                <a:lumOff val="90000"/>
+              </a:schemeClr>
+            </a:solidFill>
+          </a:ln>
+          <a:effectLst>
+            <a:outerShdw blurRad="50800" dist="38100" dir="2700000" algn="tl" rotWithShape="0">
+              <a:schemeClr val="bg1">
+                <a:lumMod val="85000"/>
+                <a:alpha val="30000"/>
+              </a:schemeClr>
+            </a:outerShdw>
+          </a:effectLst>
+        </p:spPr>
+        <p:style>
+          <a:lnRef idx="2">
+            <a:schemeClr val="accent1">
+              <a:shade val="50000"/>
+            </a:schemeClr>
+          </a:lnRef>
+          <a:fillRef idx="1">
+            <a:schemeClr val="accent1"/>
+          </a:fillRef>
+          <a:effectRef idx="0">
+            <a:schemeClr val="accent1"/>
+          </a:effectRef>
+          <a:fontRef idx="minor">
+            <a:schemeClr val="lt1"/>
+          </a:fontRef>
+        </p:style>
+        <p:txBody>
+          <a:bodyPr rtlCol="0" anchor="ctr"/>
+          <a:lstStyle/>
+          <a:p>
+            <a:pPr marL="0" marR="0" lvl="0" indent="0" algn="ctr" defTabSz="914400" rtl="0" eaLnBrk="1" fontAlgn="auto" latinLnBrk="0" hangingPunct="1">
+              <a:lnSpc>
+                <a:spcPct val="100000"/>
+              </a:lnSpc>
+              <a:spcBef>
+                <a:spcPts val="0"/>
+              </a:spcBef>
+              <a:spcAft>
+                <a:spcPts val="0"/>
+              </a:spcAft>
+              <a:buClrTx/>
+              <a:buSzTx/>
+              <a:buFontTx/>
+              <a:buNone/>
+              <a:tabLst/>
+              <a:defRPr/>
+            </a:pPr>
+            <a:endParaRPr kumimoji="0" lang="en-US" sz="1800" b="0" i="0" u="none" strike="noStrike" kern="1200" cap="none" spc="0" normalizeH="0" baseline="0" noProof="0">
+              <a:ln>
+                <a:noFill/>
+              </a:ln>
+              <a:solidFill>
+                <a:prstClr val="white"/>
+              </a:solidFill>
+              <a:effectLst/>
+              <a:uLnTx/>
+              <a:uFillTx/>
+              <a:latin typeface="Calibri" panose="020F0502020204030204"/>
+              <a:ea typeface="+mn-ea"/>
+              <a:cs typeface="+mn-cs"/>
+            </a:endParaRPr>
+          </a:p>
+        </p:txBody>
+      </p:sp>
       <p:sp>
         <p:nvSpPr>
           <p:cNvPr id="2" name="Title 1">
@@ -5767,13 +5937,20 @@
             <p:ph type="title"/>
           </p:nvPr>
         </p:nvSpPr>
-        <p:spPr/>
-        <p:txBody>
-          <a:bodyPr/>
-          <a:lstStyle/>
-          <a:p>
-            <a:r>
-              <a:rPr lang="en-NZ" dirty="0"/>
+        <p:spPr>
+          <a:xfrm>
+            <a:off x="841246" y="978619"/>
+            <a:ext cx="5991244" cy="1106424"/>
+          </a:xfrm>
+        </p:spPr>
+        <p:txBody>
+          <a:bodyPr>
+            <a:normAutofit/>
+          </a:bodyPr>
+          <a:lstStyle/>
+          <a:p>
+            <a:r>
+              <a:rPr lang="en-NZ" sz="3200"/>
               <a:t>Problems and Scope</a:t>
             </a:r>
           </a:p>
@@ -5781,6 +5958,194 @@
       </p:sp>
       <p:sp>
         <p:nvSpPr>
+          <p:cNvPr id="28" name="Rectangle 27">
+            <a:extLst>
+              <a:ext uri="{FF2B5EF4-FFF2-40B4-BE49-F238E27FC236}">
+                <a16:creationId xmlns:a16="http://schemas.microsoft.com/office/drawing/2014/main" id="{2711A8FB-68FC-45FC-B01E-38F809E2D439}"/>
+              </a:ext>
+              <a:ext uri="{C183D7F6-B498-43B3-948B-1728B52AA6E4}">
+                <adec:decorative xmlns:adec="http://schemas.microsoft.com/office/drawing/2017/decorative" val="1"/>
+              </a:ext>
+            </a:extLst>
+          </p:cNvPr>
+          <p:cNvSpPr>
+            <a:spLocks noGrp="1" noRot="1" noChangeAspect="1" noMove="1" noResize="1" noEditPoints="1" noAdjustHandles="1" noChangeArrowheads="1" noChangeShapeType="1" noTextEdit="1"/>
+          </p:cNvSpPr>
+          <p:nvPr>
+            <p:extLst>
+              <p:ext uri="{386F3935-93C4-4BCD-93E2-E3B085C9AB24}">
+                <p16:designElem xmlns:p16="http://schemas.microsoft.com/office/powerpoint/2015/main" val="1"/>
+              </p:ext>
+            </p:extLst>
+          </p:nvPr>
+        </p:nvSpPr>
+        <p:spPr>
+          <a:xfrm>
+            <a:off x="345567" y="1171300"/>
+            <a:ext cx="128016" cy="704088"/>
+          </a:xfrm>
+          <a:prstGeom prst="rect">
+            <a:avLst/>
+          </a:prstGeom>
+          <a:solidFill>
+            <a:schemeClr val="accent1"/>
+          </a:solidFill>
+          <a:ln>
+            <a:noFill/>
+          </a:ln>
+        </p:spPr>
+        <p:style>
+          <a:lnRef idx="2">
+            <a:schemeClr val="accent1">
+              <a:shade val="50000"/>
+            </a:schemeClr>
+          </a:lnRef>
+          <a:fillRef idx="1">
+            <a:schemeClr val="accent1"/>
+          </a:fillRef>
+          <a:effectRef idx="0">
+            <a:schemeClr val="accent1"/>
+          </a:effectRef>
+          <a:fontRef idx="minor">
+            <a:schemeClr val="lt1"/>
+          </a:fontRef>
+        </p:style>
+        <p:txBody>
+          <a:bodyPr rtlCol="0" anchor="ctr"/>
+          <a:lstStyle/>
+          <a:p>
+            <a:pPr marL="0" marR="0" lvl="0" indent="0" algn="ctr" defTabSz="914400" rtl="0" eaLnBrk="1" fontAlgn="auto" latinLnBrk="0" hangingPunct="1">
+              <a:lnSpc>
+                <a:spcPct val="100000"/>
+              </a:lnSpc>
+              <a:spcBef>
+                <a:spcPts val="0"/>
+              </a:spcBef>
+              <a:spcAft>
+                <a:spcPts val="0"/>
+              </a:spcAft>
+              <a:buClrTx/>
+              <a:buSzTx/>
+              <a:buFontTx/>
+              <a:buNone/>
+              <a:tabLst/>
+              <a:defRPr/>
+            </a:pPr>
+            <a:endParaRPr kumimoji="0" lang="en-US" sz="1800" b="0" i="0" u="none" strike="noStrike" kern="1200" cap="none" spc="0" normalizeH="0" baseline="0" noProof="0">
+              <a:ln>
+                <a:noFill/>
+              </a:ln>
+              <a:solidFill>
+                <a:prstClr val="white"/>
+              </a:solidFill>
+              <a:effectLst/>
+              <a:uLnTx/>
+              <a:uFillTx/>
+              <a:latin typeface="Calibri" panose="020F0502020204030204"/>
+              <a:ea typeface="+mn-ea"/>
+              <a:cs typeface="+mn-cs"/>
+            </a:endParaRPr>
+          </a:p>
+        </p:txBody>
+      </p:sp>
+      <p:sp>
+        <p:nvSpPr>
+          <p:cNvPr id="30" name="Rectangle 29">
+            <a:extLst>
+              <a:ext uri="{FF2B5EF4-FFF2-40B4-BE49-F238E27FC236}">
+                <a16:creationId xmlns:a16="http://schemas.microsoft.com/office/drawing/2014/main" id="{2A865FE3-5FC9-4049-87CF-30019C46C0F5}"/>
+              </a:ext>
+              <a:ext uri="{C183D7F6-B498-43B3-948B-1728B52AA6E4}">
+                <adec:decorative xmlns:adec="http://schemas.microsoft.com/office/drawing/2017/decorative" val="1"/>
+              </a:ext>
+            </a:extLst>
+          </p:cNvPr>
+          <p:cNvSpPr>
+            <a:spLocks noGrp="1" noRot="1" noChangeAspect="1" noMove="1" noResize="1" noEditPoints="1" noAdjustHandles="1" noChangeArrowheads="1" noChangeShapeType="1" noTextEdit="1"/>
+          </p:cNvSpPr>
+          <p:nvPr>
+            <p:extLst>
+              <p:ext uri="{386F3935-93C4-4BCD-93E2-E3B085C9AB24}">
+                <p16:designElem xmlns:p16="http://schemas.microsoft.com/office/powerpoint/2015/main" val="1"/>
+              </p:ext>
+            </p:extLst>
+          </p:nvPr>
+        </p:nvSpPr>
+        <p:spPr>
+          <a:xfrm>
+            <a:off x="877458" y="2093976"/>
+            <a:ext cx="5846683" cy="9144"/>
+          </a:xfrm>
+          <a:prstGeom prst="rect">
+            <a:avLst/>
+          </a:prstGeom>
+          <a:solidFill>
+            <a:schemeClr val="tx2">
+              <a:lumMod val="25000"/>
+              <a:lumOff val="75000"/>
+            </a:schemeClr>
+          </a:solidFill>
+          <a:ln w="3175">
+            <a:noFill/>
+          </a:ln>
+          <a:effectLst/>
+        </p:spPr>
+        <p:style>
+          <a:lnRef idx="2">
+            <a:schemeClr val="accent1">
+              <a:shade val="50000"/>
+            </a:schemeClr>
+          </a:lnRef>
+          <a:fillRef idx="1">
+            <a:schemeClr val="accent1"/>
+          </a:fillRef>
+          <a:effectRef idx="0">
+            <a:schemeClr val="accent1"/>
+          </a:effectRef>
+          <a:fontRef idx="minor">
+            <a:schemeClr val="lt1"/>
+          </a:fontRef>
+        </p:style>
+        <p:txBody>
+          <a:bodyPr rtlCol="0" anchor="ctr"/>
+          <a:lstStyle/>
+          <a:p>
+            <a:pPr marL="0" marR="0" lvl="0" indent="0" algn="ctr" defTabSz="914400" rtl="0" eaLnBrk="1" fontAlgn="auto" latinLnBrk="0" hangingPunct="1">
+              <a:lnSpc>
+                <a:spcPct val="100000"/>
+              </a:lnSpc>
+              <a:spcBef>
+                <a:spcPts val="0"/>
+              </a:spcBef>
+              <a:spcAft>
+                <a:spcPts val="0"/>
+              </a:spcAft>
+              <a:buClrTx/>
+              <a:buSzTx/>
+              <a:buFontTx/>
+              <a:buNone/>
+              <a:tabLst/>
+              <a:defRPr/>
+            </a:pPr>
+            <a:endParaRPr kumimoji="0" lang="en-US" sz="1800" b="0" i="0" u="none" strike="noStrike" kern="1200" cap="none" spc="0" normalizeH="0" baseline="0" noProof="0">
+              <a:ln>
+                <a:noFill/>
+              </a:ln>
+              <a:solidFill>
+                <a:prstClr val="white"/>
+              </a:solidFill>
+              <a:effectLst/>
+              <a:uLnTx/>
+              <a:uFillTx/>
+              <a:latin typeface="Calibri" panose="020F0502020204030204"/>
+              <a:ea typeface="+mn-ea"/>
+              <a:cs typeface="+mn-cs"/>
+            </a:endParaRPr>
+          </a:p>
+        </p:txBody>
+      </p:sp>
+      <p:sp>
+        <p:nvSpPr>
           <p:cNvPr id="3" name="Content Placeholder 2">
             <a:extLst>
               <a:ext uri="{FF2B5EF4-FFF2-40B4-BE49-F238E27FC236}">
@@ -5795,27 +6160,64 @@
             <p:ph idx="1"/>
           </p:nvPr>
         </p:nvSpPr>
-        <p:spPr/>
-        <p:txBody>
-          <a:bodyPr/>
-          <a:lstStyle/>
-          <a:p>
-            <a:r>
-              <a:rPr lang="en-NZ" dirty="0"/>
+        <p:spPr>
+          <a:xfrm>
+            <a:off x="841248" y="2252870"/>
+            <a:ext cx="5993892" cy="3560251"/>
+          </a:xfrm>
+        </p:spPr>
+        <p:txBody>
+          <a:bodyPr>
+            <a:normAutofit/>
+          </a:bodyPr>
+          <a:lstStyle/>
+          <a:p>
+            <a:r>
+              <a:rPr lang="en-NZ" sz="1800"/>
               <a:t>Figured out early that my scope would be too big so 2 Arduinos would make life much easier</a:t>
             </a:r>
           </a:p>
           <a:p>
             <a:r>
-              <a:rPr lang="en-NZ" dirty="0"/>
+              <a:rPr lang="en-NZ" sz="1800"/>
               <a:t>3d Printing is a big problem after all the iterations, and maintenance the printers had</a:t>
             </a:r>
           </a:p>
           <a:p>
-            <a:endParaRPr lang="en-NZ" dirty="0"/>
-          </a:p>
-        </p:txBody>
-      </p:sp>
+            <a:endParaRPr lang="en-NZ" sz="1800"/>
+          </a:p>
+        </p:txBody>
+      </p:sp>
+      <p:pic>
+        <p:nvPicPr>
+          <p:cNvPr id="10" name="Picture 9">
+            <a:extLst>
+              <a:ext uri="{FF2B5EF4-FFF2-40B4-BE49-F238E27FC236}">
+                <a16:creationId xmlns:a16="http://schemas.microsoft.com/office/drawing/2014/main" id="{E86586B4-1AB7-5B9A-6C83-C5D5D2548925}"/>
+              </a:ext>
+            </a:extLst>
+          </p:cNvPr>
+          <p:cNvPicPr>
+            <a:picLocks noChangeAspect="1"/>
+          </p:cNvPicPr>
+          <p:nvPr/>
+        </p:nvPicPr>
+        <p:blipFill>
+          <a:blip r:embed="rId2"/>
+          <a:stretch>
+            <a:fillRect/>
+          </a:stretch>
+        </p:blipFill>
+        <p:spPr>
+          <a:xfrm>
+            <a:off x="7679814" y="656012"/>
+            <a:ext cx="4097657" cy="5445391"/>
+          </a:xfrm>
+          <a:prstGeom prst="rect">
+            <a:avLst/>
+          </a:prstGeom>
+        </p:spPr>
+      </p:pic>
     </p:spTree>
     <p:extLst>
       <p:ext uri="{BB962C8B-B14F-4D97-AF65-F5344CB8AC3E}">
@@ -5924,6 +6326,14 @@
 <file path=ppt/slides/slide6.xml><?xml version="1.0" encoding="utf-8"?>
 <p:sld xmlns:a="http://schemas.openxmlformats.org/drawingml/2006/main" xmlns:r="http://schemas.openxmlformats.org/officeDocument/2006/relationships" xmlns:p="http://schemas.openxmlformats.org/presentationml/2006/main">
   <p:cSld>
+    <p:bg>
+      <p:bgPr>
+        <a:solidFill>
+          <a:schemeClr val="bg1"/>
+        </a:solidFill>
+        <a:effectLst/>
+      </p:bgPr>
+    </p:bg>
     <p:spTree>
       <p:nvGrpSpPr>
         <p:cNvPr id="1" name=""/>
@@ -5938,6 +6348,168 @@
           <a:chExt cx="0" cy="0"/>
         </a:xfrm>
       </p:grpSpPr>
+      <p:sp useBgFill="1">
+        <p:nvSpPr>
+          <p:cNvPr id="20" name="Rectangle 19">
+            <a:extLst>
+              <a:ext uri="{FF2B5EF4-FFF2-40B4-BE49-F238E27FC236}">
+                <a16:creationId xmlns:a16="http://schemas.microsoft.com/office/drawing/2014/main" id="{2C9A9DA9-7DC8-488B-A882-123947B0F3D9}"/>
+              </a:ext>
+              <a:ext uri="{C183D7F6-B498-43B3-948B-1728B52AA6E4}">
+                <adec:decorative xmlns:adec="http://schemas.microsoft.com/office/drawing/2017/decorative" val="1"/>
+              </a:ext>
+            </a:extLst>
+          </p:cNvPr>
+          <p:cNvSpPr>
+            <a:spLocks noGrp="1" noRot="1" noChangeAspect="1" noMove="1" noResize="1" noEditPoints="1" noAdjustHandles="1" noChangeArrowheads="1" noChangeShapeType="1" noTextEdit="1"/>
+          </p:cNvSpPr>
+          <p:nvPr>
+            <p:extLst>
+              <p:ext uri="{386F3935-93C4-4BCD-93E2-E3B085C9AB24}">
+                <p16:designElem xmlns:p16="http://schemas.microsoft.com/office/powerpoint/2015/main" val="1"/>
+              </p:ext>
+            </p:extLst>
+          </p:nvPr>
+        </p:nvSpPr>
+        <p:spPr>
+          <a:xfrm>
+            <a:off x="0" y="0"/>
+            <a:ext cx="12192000" cy="6858000"/>
+          </a:xfrm>
+          <a:prstGeom prst="rect">
+            <a:avLst/>
+          </a:prstGeom>
+          <a:ln>
+            <a:noFill/>
+          </a:ln>
+        </p:spPr>
+        <p:style>
+          <a:lnRef idx="2">
+            <a:schemeClr val="accent1">
+              <a:shade val="50000"/>
+            </a:schemeClr>
+          </a:lnRef>
+          <a:fillRef idx="1">
+            <a:schemeClr val="accent1"/>
+          </a:fillRef>
+          <a:effectRef idx="0">
+            <a:schemeClr val="accent1"/>
+          </a:effectRef>
+          <a:fontRef idx="minor">
+            <a:schemeClr val="lt1"/>
+          </a:fontRef>
+        </p:style>
+        <p:txBody>
+          <a:bodyPr rtlCol="0" anchor="ctr"/>
+          <a:lstStyle/>
+          <a:p>
+            <a:pPr algn="ctr"/>
+            <a:endParaRPr lang="en-US"/>
+          </a:p>
+        </p:txBody>
+      </p:sp>
+      <p:sp useBgFill="1">
+        <p:nvSpPr>
+          <p:cNvPr id="22" name="Rectangle 21">
+            <a:extLst>
+              <a:ext uri="{FF2B5EF4-FFF2-40B4-BE49-F238E27FC236}">
+                <a16:creationId xmlns:a16="http://schemas.microsoft.com/office/drawing/2014/main" id="{57F6BDD4-E066-4008-8011-6CC31AEB4556}"/>
+              </a:ext>
+              <a:ext uri="{C183D7F6-B498-43B3-948B-1728B52AA6E4}">
+                <adec:decorative xmlns:adec="http://schemas.microsoft.com/office/drawing/2017/decorative" val="1"/>
+              </a:ext>
+            </a:extLst>
+          </p:cNvPr>
+          <p:cNvSpPr>
+            <a:spLocks noGrp="1" noRot="1" noChangeAspect="1" noMove="1" noResize="1" noEditPoints="1" noAdjustHandles="1" noChangeArrowheads="1" noChangeShapeType="1" noTextEdit="1"/>
+          </p:cNvSpPr>
+          <p:nvPr>
+            <p:extLst>
+              <p:ext uri="{386F3935-93C4-4BCD-93E2-E3B085C9AB24}">
+                <p16:designElem xmlns:p16="http://schemas.microsoft.com/office/powerpoint/2015/main" val="1"/>
+              </p:ext>
+            </p:extLst>
+          </p:nvPr>
+        </p:nvSpPr>
+        <p:spPr>
+          <a:xfrm>
+            <a:off x="4943857" y="633619"/>
+            <a:ext cx="6838569" cy="5495925"/>
+          </a:xfrm>
+          <a:prstGeom prst="rect">
+            <a:avLst/>
+          </a:prstGeom>
+          <a:ln w="9525">
+            <a:solidFill>
+              <a:schemeClr val="tx2">
+                <a:lumMod val="10000"/>
+                <a:lumOff val="90000"/>
+              </a:schemeClr>
+            </a:solidFill>
+          </a:ln>
+          <a:effectLst>
+            <a:outerShdw blurRad="50800" dist="38100" dir="2700000" algn="tl" rotWithShape="0">
+              <a:schemeClr val="bg1">
+                <a:lumMod val="85000"/>
+                <a:alpha val="30000"/>
+              </a:schemeClr>
+            </a:outerShdw>
+          </a:effectLst>
+        </p:spPr>
+        <p:style>
+          <a:lnRef idx="2">
+            <a:schemeClr val="accent1">
+              <a:shade val="50000"/>
+            </a:schemeClr>
+          </a:lnRef>
+          <a:fillRef idx="1">
+            <a:schemeClr val="accent1"/>
+          </a:fillRef>
+          <a:effectRef idx="0">
+            <a:schemeClr val="accent1"/>
+          </a:effectRef>
+          <a:fontRef idx="minor">
+            <a:schemeClr val="lt1"/>
+          </a:fontRef>
+        </p:style>
+        <p:txBody>
+          <a:bodyPr rtlCol="0" anchor="ctr"/>
+          <a:lstStyle/>
+          <a:p>
+            <a:pPr marL="0" marR="0" lvl="0" indent="0" algn="ctr" defTabSz="914400" rtl="0" eaLnBrk="1" fontAlgn="auto" latinLnBrk="0" hangingPunct="1">
+              <a:lnSpc>
+                <a:spcPct val="100000"/>
+              </a:lnSpc>
+              <a:spcBef>
+                <a:spcPts val="0"/>
+              </a:spcBef>
+              <a:spcAft>
+                <a:spcPts val="0"/>
+              </a:spcAft>
+              <a:buClrTx/>
+              <a:buSzTx/>
+              <a:buFontTx/>
+              <a:buNone/>
+              <a:tabLst/>
+              <a:defRPr/>
+            </a:pPr>
+            <a:endParaRPr kumimoji="0" lang="en-US" sz="1800" b="0" i="0" u="none" strike="noStrike" kern="1200" cap="none" spc="0" normalizeH="0" baseline="0" noProof="0">
+              <a:ln>
+                <a:noFill/>
+              </a:ln>
+              <a:solidFill>
+                <a:prstClr val="white"/>
+              </a:solidFill>
+              <a:effectLst/>
+              <a:uLnTx/>
+              <a:uFillTx/>
+              <a:latin typeface="Calibri" panose="020F0502020204030204"/>
+              <a:ea typeface="+mn-ea"/>
+              <a:cs typeface="+mn-cs"/>
+            </a:endParaRPr>
+          </a:p>
+        </p:txBody>
+      </p:sp>
       <p:sp>
         <p:nvSpPr>
           <p:cNvPr id="2" name="Title 1">
@@ -5954,18 +6526,243 @@
             <p:ph type="title"/>
           </p:nvPr>
         </p:nvSpPr>
-        <p:spPr/>
-        <p:txBody>
-          <a:bodyPr/>
-          <a:lstStyle/>
-          <a:p>
-            <a:r>
-              <a:rPr lang="en-NZ" dirty="0"/>
+        <p:spPr>
+          <a:xfrm>
+            <a:off x="5359510" y="978619"/>
+            <a:ext cx="5991244" cy="1106424"/>
+          </a:xfrm>
+        </p:spPr>
+        <p:txBody>
+          <a:bodyPr>
+            <a:normAutofit/>
+          </a:bodyPr>
+          <a:lstStyle/>
+          <a:p>
+            <a:r>
+              <a:rPr lang="en-NZ" sz="3200"/>
               <a:t>Discoveries we made</a:t>
             </a:r>
           </a:p>
         </p:txBody>
       </p:sp>
+      <p:pic>
+        <p:nvPicPr>
+          <p:cNvPr id="6" name="Picture 5">
+            <a:extLst>
+              <a:ext uri="{FF2B5EF4-FFF2-40B4-BE49-F238E27FC236}">
+                <a16:creationId xmlns:a16="http://schemas.microsoft.com/office/drawing/2014/main" id="{29980031-76A7-4F60-7588-1E3E77433EF6}"/>
+              </a:ext>
+            </a:extLst>
+          </p:cNvPr>
+          <p:cNvPicPr>
+            <a:picLocks noChangeAspect="1"/>
+          </p:cNvPicPr>
+          <p:nvPr/>
+        </p:nvPicPr>
+        <p:blipFill>
+          <a:blip r:embed="rId2"/>
+          <a:stretch>
+            <a:fillRect/>
+          </a:stretch>
+        </p:blipFill>
+        <p:spPr>
+          <a:xfrm>
+            <a:off x="414528" y="698544"/>
+            <a:ext cx="4033647" cy="5360328"/>
+          </a:xfrm>
+          <a:prstGeom prst="rect">
+            <a:avLst/>
+          </a:prstGeom>
+        </p:spPr>
+      </p:pic>
+      <p:sp>
+        <p:nvSpPr>
+          <p:cNvPr id="24" name="Rectangle 23">
+            <a:extLst>
+              <a:ext uri="{FF2B5EF4-FFF2-40B4-BE49-F238E27FC236}">
+                <a16:creationId xmlns:a16="http://schemas.microsoft.com/office/drawing/2014/main" id="{2711A8FB-68FC-45FC-B01E-38F809E2D439}"/>
+              </a:ext>
+              <a:ext uri="{C183D7F6-B498-43B3-948B-1728B52AA6E4}">
+                <adec:decorative xmlns:adec="http://schemas.microsoft.com/office/drawing/2017/decorative" val="1"/>
+              </a:ext>
+            </a:extLst>
+          </p:cNvPr>
+          <p:cNvSpPr>
+            <a:spLocks noGrp="1" noRot="1" noChangeAspect="1" noMove="1" noResize="1" noEditPoints="1" noAdjustHandles="1" noChangeArrowheads="1" noChangeShapeType="1" noTextEdit="1"/>
+          </p:cNvSpPr>
+          <p:nvPr>
+            <p:extLst>
+              <p:ext uri="{386F3935-93C4-4BCD-93E2-E3B085C9AB24}">
+                <p16:designElem xmlns:p16="http://schemas.microsoft.com/office/powerpoint/2015/main" val="1"/>
+              </p:ext>
+            </p:extLst>
+          </p:nvPr>
+        </p:nvSpPr>
+        <p:spPr>
+          <a:xfrm>
+            <a:off x="4879848" y="1171300"/>
+            <a:ext cx="128016" cy="704088"/>
+          </a:xfrm>
+          <a:prstGeom prst="rect">
+            <a:avLst/>
+          </a:prstGeom>
+          <a:solidFill>
+            <a:schemeClr val="accent1"/>
+          </a:solidFill>
+          <a:ln>
+            <a:noFill/>
+          </a:ln>
+        </p:spPr>
+        <p:style>
+          <a:lnRef idx="2">
+            <a:schemeClr val="accent1">
+              <a:shade val="50000"/>
+            </a:schemeClr>
+          </a:lnRef>
+          <a:fillRef idx="1">
+            <a:schemeClr val="accent1"/>
+          </a:fillRef>
+          <a:effectRef idx="0">
+            <a:schemeClr val="accent1"/>
+          </a:effectRef>
+          <a:fontRef idx="minor">
+            <a:schemeClr val="lt1"/>
+          </a:fontRef>
+        </p:style>
+        <p:txBody>
+          <a:bodyPr rtlCol="0" anchor="ctr"/>
+          <a:lstStyle/>
+          <a:p>
+            <a:pPr marL="0" marR="0" lvl="0" indent="0" algn="ctr" defTabSz="914400" rtl="0" eaLnBrk="1" fontAlgn="auto" latinLnBrk="0" hangingPunct="1">
+              <a:lnSpc>
+                <a:spcPct val="100000"/>
+              </a:lnSpc>
+              <a:spcBef>
+                <a:spcPts val="0"/>
+              </a:spcBef>
+              <a:spcAft>
+                <a:spcPts val="0"/>
+              </a:spcAft>
+              <a:buClrTx/>
+              <a:buSzTx/>
+              <a:buFontTx/>
+              <a:buNone/>
+              <a:tabLst/>
+              <a:defRPr/>
+            </a:pPr>
+            <a:endParaRPr kumimoji="0" lang="en-US" sz="1800" b="0" i="0" u="none" strike="noStrike" kern="1200" cap="none" spc="0" normalizeH="0" baseline="0" noProof="0">
+              <a:ln>
+                <a:noFill/>
+              </a:ln>
+              <a:solidFill>
+                <a:prstClr val="white"/>
+              </a:solidFill>
+              <a:effectLst/>
+              <a:uLnTx/>
+              <a:uFillTx/>
+              <a:latin typeface="Calibri" panose="020F0502020204030204"/>
+              <a:ea typeface="+mn-ea"/>
+              <a:cs typeface="+mn-cs"/>
+            </a:endParaRPr>
+          </a:p>
+        </p:txBody>
+      </p:sp>
+      <p:sp>
+        <p:nvSpPr>
+          <p:cNvPr id="26" name="Rectangle 25">
+            <a:extLst>
+              <a:ext uri="{FF2B5EF4-FFF2-40B4-BE49-F238E27FC236}">
+                <a16:creationId xmlns:a16="http://schemas.microsoft.com/office/drawing/2014/main" id="{2A865FE3-5FC9-4049-87CF-30019C46C0F5}"/>
+              </a:ext>
+              <a:ext uri="{C183D7F6-B498-43B3-948B-1728B52AA6E4}">
+                <adec:decorative xmlns:adec="http://schemas.microsoft.com/office/drawing/2017/decorative" val="1"/>
+              </a:ext>
+            </a:extLst>
+          </p:cNvPr>
+          <p:cNvSpPr>
+            <a:spLocks noGrp="1" noRot="1" noChangeAspect="1" noMove="1" noResize="1" noEditPoints="1" noAdjustHandles="1" noChangeArrowheads="1" noChangeShapeType="1" noTextEdit="1"/>
+          </p:cNvSpPr>
+          <p:nvPr>
+            <p:extLst>
+              <p:ext uri="{386F3935-93C4-4BCD-93E2-E3B085C9AB24}">
+                <p16:designElem xmlns:p16="http://schemas.microsoft.com/office/powerpoint/2015/main" val="1"/>
+              </p:ext>
+            </p:extLst>
+          </p:nvPr>
+        </p:nvSpPr>
+        <p:spPr>
+          <a:xfrm>
+            <a:off x="5467859" y="2093976"/>
+            <a:ext cx="5846683" cy="9144"/>
+          </a:xfrm>
+          <a:prstGeom prst="rect">
+            <a:avLst/>
+          </a:prstGeom>
+          <a:solidFill>
+            <a:schemeClr val="tx2">
+              <a:lumMod val="25000"/>
+              <a:lumOff val="75000"/>
+            </a:schemeClr>
+          </a:solidFill>
+          <a:ln w="3175">
+            <a:noFill/>
+          </a:ln>
+          <a:effectLst/>
+        </p:spPr>
+        <p:style>
+          <a:lnRef idx="2">
+            <a:schemeClr val="accent1">
+              <a:shade val="50000"/>
+            </a:schemeClr>
+          </a:lnRef>
+          <a:fillRef idx="1">
+            <a:schemeClr val="accent1"/>
+          </a:fillRef>
+          <a:effectRef idx="0">
+            <a:schemeClr val="accent1"/>
+          </a:effectRef>
+          <a:fontRef idx="minor">
+            <a:schemeClr val="lt1"/>
+          </a:fontRef>
+        </p:style>
+        <p:txBody>
+          <a:bodyPr rtlCol="0" anchor="ctr"/>
+          <a:lstStyle/>
+          <a:p>
+            <a:pPr marL="0" marR="0" lvl="0" indent="0" algn="ctr" defTabSz="914400" rtl="0" eaLnBrk="1" fontAlgn="auto" latinLnBrk="0" hangingPunct="1">
+              <a:lnSpc>
+                <a:spcPct val="100000"/>
+              </a:lnSpc>
+              <a:spcBef>
+                <a:spcPts val="0"/>
+              </a:spcBef>
+              <a:spcAft>
+                <a:spcPts val="0"/>
+              </a:spcAft>
+              <a:buClrTx/>
+              <a:buSzTx/>
+              <a:buFontTx/>
+              <a:buNone/>
+              <a:tabLst/>
+              <a:defRPr/>
+            </a:pPr>
+            <a:endParaRPr kumimoji="0" lang="en-US" sz="1800" b="0" i="0" u="none" strike="noStrike" kern="1200" cap="none" spc="0" normalizeH="0" baseline="0" noProof="0">
+              <a:ln>
+                <a:noFill/>
+              </a:ln>
+              <a:solidFill>
+                <a:prstClr val="white"/>
+              </a:solidFill>
+              <a:effectLst/>
+              <a:uLnTx/>
+              <a:uFillTx/>
+              <a:latin typeface="Calibri" panose="020F0502020204030204"/>
+              <a:ea typeface="+mn-ea"/>
+              <a:cs typeface="+mn-cs"/>
+            </a:endParaRPr>
+          </a:p>
+        </p:txBody>
+      </p:sp>
       <p:sp>
         <p:nvSpPr>
           <p:cNvPr id="3" name="Content Placeholder 2">
@@ -5982,25 +6779,32 @@
             <p:ph idx="1"/>
           </p:nvPr>
         </p:nvSpPr>
-        <p:spPr/>
-        <p:txBody>
-          <a:bodyPr/>
-          <a:lstStyle/>
-          <a:p>
-            <a:r>
-              <a:rPr lang="en-NZ" dirty="0"/>
+        <p:spPr>
+          <a:xfrm>
+            <a:off x="5356861" y="2252870"/>
+            <a:ext cx="5993892" cy="3560251"/>
+          </a:xfrm>
+        </p:spPr>
+        <p:txBody>
+          <a:bodyPr>
+            <a:normAutofit/>
+          </a:bodyPr>
+          <a:lstStyle/>
+          <a:p>
+            <a:r>
+              <a:rPr lang="en-NZ" sz="1800"/>
               <a:t>Start 3D printing early :\</a:t>
             </a:r>
           </a:p>
           <a:p>
             <a:r>
-              <a:rPr lang="en-NZ" dirty="0"/>
+              <a:rPr lang="en-NZ" sz="1800"/>
               <a:t>3D printing tons of things can go wrong (it did for us) so learn and keep an eye on it</a:t>
             </a:r>
           </a:p>
           <a:p>
             <a:r>
-              <a:rPr lang="en-NZ" dirty="0"/>
+              <a:rPr lang="en-NZ" sz="1800"/>
               <a:t>Plan as much as you can because you will discover things you didn’t know you would need.</a:t>
             </a:r>
           </a:p>
@@ -6022,6 +6826,14 @@
 <file path=ppt/slides/slide7.xml><?xml version="1.0" encoding="utf-8"?>
 <p:sld xmlns:a="http://schemas.openxmlformats.org/drawingml/2006/main" xmlns:r="http://schemas.openxmlformats.org/officeDocument/2006/relationships" xmlns:p="http://schemas.openxmlformats.org/presentationml/2006/main">
   <p:cSld>
+    <p:bg>
+      <p:bgPr>
+        <a:solidFill>
+          <a:schemeClr val="bg1"/>
+        </a:solidFill>
+        <a:effectLst/>
+      </p:bgPr>
+    </p:bg>
     <p:spTree>
       <p:nvGrpSpPr>
         <p:cNvPr id="1" name=""/>
@@ -6036,6 +6848,168 @@
           <a:chExt cx="0" cy="0"/>
         </a:xfrm>
       </p:grpSpPr>
+      <p:sp useBgFill="1">
+        <p:nvSpPr>
+          <p:cNvPr id="11" name="Rectangle 10">
+            <a:extLst>
+              <a:ext uri="{FF2B5EF4-FFF2-40B4-BE49-F238E27FC236}">
+                <a16:creationId xmlns:a16="http://schemas.microsoft.com/office/drawing/2014/main" id="{2C9A9DA9-7DC8-488B-A882-123947B0F3D9}"/>
+              </a:ext>
+              <a:ext uri="{C183D7F6-B498-43B3-948B-1728B52AA6E4}">
+                <adec:decorative xmlns:adec="http://schemas.microsoft.com/office/drawing/2017/decorative" val="1"/>
+              </a:ext>
+            </a:extLst>
+          </p:cNvPr>
+          <p:cNvSpPr>
+            <a:spLocks noGrp="1" noRot="1" noChangeAspect="1" noMove="1" noResize="1" noEditPoints="1" noAdjustHandles="1" noChangeArrowheads="1" noChangeShapeType="1" noTextEdit="1"/>
+          </p:cNvSpPr>
+          <p:nvPr>
+            <p:extLst>
+              <p:ext uri="{386F3935-93C4-4BCD-93E2-E3B085C9AB24}">
+                <p16:designElem xmlns:p16="http://schemas.microsoft.com/office/powerpoint/2015/main" val="1"/>
+              </p:ext>
+            </p:extLst>
+          </p:nvPr>
+        </p:nvSpPr>
+        <p:spPr>
+          <a:xfrm>
+            <a:off x="0" y="0"/>
+            <a:ext cx="12192000" cy="6858000"/>
+          </a:xfrm>
+          <a:prstGeom prst="rect">
+            <a:avLst/>
+          </a:prstGeom>
+          <a:ln>
+            <a:noFill/>
+          </a:ln>
+        </p:spPr>
+        <p:style>
+          <a:lnRef idx="2">
+            <a:schemeClr val="accent1">
+              <a:shade val="50000"/>
+            </a:schemeClr>
+          </a:lnRef>
+          <a:fillRef idx="1">
+            <a:schemeClr val="accent1"/>
+          </a:fillRef>
+          <a:effectRef idx="0">
+            <a:schemeClr val="accent1"/>
+          </a:effectRef>
+          <a:fontRef idx="minor">
+            <a:schemeClr val="lt1"/>
+          </a:fontRef>
+        </p:style>
+        <p:txBody>
+          <a:bodyPr rtlCol="0" anchor="ctr"/>
+          <a:lstStyle/>
+          <a:p>
+            <a:pPr algn="ctr"/>
+            <a:endParaRPr lang="en-US"/>
+          </a:p>
+        </p:txBody>
+      </p:sp>
+      <p:sp useBgFill="1">
+        <p:nvSpPr>
+          <p:cNvPr id="13" name="Rectangle 12">
+            <a:extLst>
+              <a:ext uri="{FF2B5EF4-FFF2-40B4-BE49-F238E27FC236}">
+                <a16:creationId xmlns:a16="http://schemas.microsoft.com/office/drawing/2014/main" id="{57F6BDD4-E066-4008-8011-6CC31AEB4556}"/>
+              </a:ext>
+              <a:ext uri="{C183D7F6-B498-43B3-948B-1728B52AA6E4}">
+                <adec:decorative xmlns:adec="http://schemas.microsoft.com/office/drawing/2017/decorative" val="1"/>
+              </a:ext>
+            </a:extLst>
+          </p:cNvPr>
+          <p:cNvSpPr>
+            <a:spLocks noGrp="1" noRot="1" noChangeAspect="1" noMove="1" noResize="1" noEditPoints="1" noAdjustHandles="1" noChangeArrowheads="1" noChangeShapeType="1" noTextEdit="1"/>
+          </p:cNvSpPr>
+          <p:nvPr>
+            <p:extLst>
+              <p:ext uri="{386F3935-93C4-4BCD-93E2-E3B085C9AB24}">
+                <p16:designElem xmlns:p16="http://schemas.microsoft.com/office/powerpoint/2015/main" val="1"/>
+              </p:ext>
+            </p:extLst>
+          </p:nvPr>
+        </p:nvSpPr>
+        <p:spPr>
+          <a:xfrm>
+            <a:off x="409575" y="633619"/>
+            <a:ext cx="6838569" cy="5495925"/>
+          </a:xfrm>
+          <a:prstGeom prst="rect">
+            <a:avLst/>
+          </a:prstGeom>
+          <a:ln w="9525">
+            <a:solidFill>
+              <a:schemeClr val="tx2">
+                <a:lumMod val="10000"/>
+                <a:lumOff val="90000"/>
+              </a:schemeClr>
+            </a:solidFill>
+          </a:ln>
+          <a:effectLst>
+            <a:outerShdw blurRad="50800" dist="38100" dir="2700000" algn="tl" rotWithShape="0">
+              <a:schemeClr val="bg1">
+                <a:lumMod val="85000"/>
+                <a:alpha val="30000"/>
+              </a:schemeClr>
+            </a:outerShdw>
+          </a:effectLst>
+        </p:spPr>
+        <p:style>
+          <a:lnRef idx="2">
+            <a:schemeClr val="accent1">
+              <a:shade val="50000"/>
+            </a:schemeClr>
+          </a:lnRef>
+          <a:fillRef idx="1">
+            <a:schemeClr val="accent1"/>
+          </a:fillRef>
+          <a:effectRef idx="0">
+            <a:schemeClr val="accent1"/>
+          </a:effectRef>
+          <a:fontRef idx="minor">
+            <a:schemeClr val="lt1"/>
+          </a:fontRef>
+        </p:style>
+        <p:txBody>
+          <a:bodyPr rtlCol="0" anchor="ctr"/>
+          <a:lstStyle/>
+          <a:p>
+            <a:pPr marL="0" marR="0" lvl="0" indent="0" algn="ctr" defTabSz="914400" rtl="0" eaLnBrk="1" fontAlgn="auto" latinLnBrk="0" hangingPunct="1">
+              <a:lnSpc>
+                <a:spcPct val="100000"/>
+              </a:lnSpc>
+              <a:spcBef>
+                <a:spcPts val="0"/>
+              </a:spcBef>
+              <a:spcAft>
+                <a:spcPts val="0"/>
+              </a:spcAft>
+              <a:buClrTx/>
+              <a:buSzTx/>
+              <a:buFontTx/>
+              <a:buNone/>
+              <a:tabLst/>
+              <a:defRPr/>
+            </a:pPr>
+            <a:endParaRPr kumimoji="0" lang="en-US" sz="1800" b="0" i="0" u="none" strike="noStrike" kern="1200" cap="none" spc="0" normalizeH="0" baseline="0" noProof="0">
+              <a:ln>
+                <a:noFill/>
+              </a:ln>
+              <a:solidFill>
+                <a:prstClr val="white"/>
+              </a:solidFill>
+              <a:effectLst/>
+              <a:uLnTx/>
+              <a:uFillTx/>
+              <a:latin typeface="Calibri" panose="020F0502020204030204"/>
+              <a:ea typeface="+mn-ea"/>
+              <a:cs typeface="+mn-cs"/>
+            </a:endParaRPr>
+          </a:p>
+        </p:txBody>
+      </p:sp>
       <p:sp>
         <p:nvSpPr>
           <p:cNvPr id="2" name="Title 1">
@@ -6052,13 +7026,20 @@
             <p:ph type="title"/>
           </p:nvPr>
         </p:nvSpPr>
-        <p:spPr/>
-        <p:txBody>
-          <a:bodyPr/>
-          <a:lstStyle/>
-          <a:p>
-            <a:r>
-              <a:rPr lang="en-NZ" dirty="0"/>
+        <p:spPr>
+          <a:xfrm>
+            <a:off x="841246" y="978619"/>
+            <a:ext cx="5991244" cy="1106424"/>
+          </a:xfrm>
+        </p:spPr>
+        <p:txBody>
+          <a:bodyPr>
+            <a:normAutofit/>
+          </a:bodyPr>
+          <a:lstStyle/>
+          <a:p>
+            <a:r>
+              <a:rPr lang="en-NZ" sz="3200"/>
               <a:t>Things to know</a:t>
             </a:r>
           </a:p>
@@ -6066,6 +7047,194 @@
       </p:sp>
       <p:sp>
         <p:nvSpPr>
+          <p:cNvPr id="15" name="Rectangle 14">
+            <a:extLst>
+              <a:ext uri="{FF2B5EF4-FFF2-40B4-BE49-F238E27FC236}">
+                <a16:creationId xmlns:a16="http://schemas.microsoft.com/office/drawing/2014/main" id="{2711A8FB-68FC-45FC-B01E-38F809E2D439}"/>
+              </a:ext>
+              <a:ext uri="{C183D7F6-B498-43B3-948B-1728B52AA6E4}">
+                <adec:decorative xmlns:adec="http://schemas.microsoft.com/office/drawing/2017/decorative" val="1"/>
+              </a:ext>
+            </a:extLst>
+          </p:cNvPr>
+          <p:cNvSpPr>
+            <a:spLocks noGrp="1" noRot="1" noChangeAspect="1" noMove="1" noResize="1" noEditPoints="1" noAdjustHandles="1" noChangeArrowheads="1" noChangeShapeType="1" noTextEdit="1"/>
+          </p:cNvSpPr>
+          <p:nvPr>
+            <p:extLst>
+              <p:ext uri="{386F3935-93C4-4BCD-93E2-E3B085C9AB24}">
+                <p16:designElem xmlns:p16="http://schemas.microsoft.com/office/powerpoint/2015/main" val="1"/>
+              </p:ext>
+            </p:extLst>
+          </p:nvPr>
+        </p:nvSpPr>
+        <p:spPr>
+          <a:xfrm>
+            <a:off x="345567" y="1171300"/>
+            <a:ext cx="128016" cy="704088"/>
+          </a:xfrm>
+          <a:prstGeom prst="rect">
+            <a:avLst/>
+          </a:prstGeom>
+          <a:solidFill>
+            <a:schemeClr val="accent1"/>
+          </a:solidFill>
+          <a:ln>
+            <a:noFill/>
+          </a:ln>
+        </p:spPr>
+        <p:style>
+          <a:lnRef idx="2">
+            <a:schemeClr val="accent1">
+              <a:shade val="50000"/>
+            </a:schemeClr>
+          </a:lnRef>
+          <a:fillRef idx="1">
+            <a:schemeClr val="accent1"/>
+          </a:fillRef>
+          <a:effectRef idx="0">
+            <a:schemeClr val="accent1"/>
+          </a:effectRef>
+          <a:fontRef idx="minor">
+            <a:schemeClr val="lt1"/>
+          </a:fontRef>
+        </p:style>
+        <p:txBody>
+          <a:bodyPr rtlCol="0" anchor="ctr"/>
+          <a:lstStyle/>
+          <a:p>
+            <a:pPr marL="0" marR="0" lvl="0" indent="0" algn="ctr" defTabSz="914400" rtl="0" eaLnBrk="1" fontAlgn="auto" latinLnBrk="0" hangingPunct="1">
+              <a:lnSpc>
+                <a:spcPct val="100000"/>
+              </a:lnSpc>
+              <a:spcBef>
+                <a:spcPts val="0"/>
+              </a:spcBef>
+              <a:spcAft>
+                <a:spcPts val="0"/>
+              </a:spcAft>
+              <a:buClrTx/>
+              <a:buSzTx/>
+              <a:buFontTx/>
+              <a:buNone/>
+              <a:tabLst/>
+              <a:defRPr/>
+            </a:pPr>
+            <a:endParaRPr kumimoji="0" lang="en-US" sz="1800" b="0" i="0" u="none" strike="noStrike" kern="1200" cap="none" spc="0" normalizeH="0" baseline="0" noProof="0">
+              <a:ln>
+                <a:noFill/>
+              </a:ln>
+              <a:solidFill>
+                <a:prstClr val="white"/>
+              </a:solidFill>
+              <a:effectLst/>
+              <a:uLnTx/>
+              <a:uFillTx/>
+              <a:latin typeface="Calibri" panose="020F0502020204030204"/>
+              <a:ea typeface="+mn-ea"/>
+              <a:cs typeface="+mn-cs"/>
+            </a:endParaRPr>
+          </a:p>
+        </p:txBody>
+      </p:sp>
+      <p:sp>
+        <p:nvSpPr>
+          <p:cNvPr id="17" name="Rectangle 16">
+            <a:extLst>
+              <a:ext uri="{FF2B5EF4-FFF2-40B4-BE49-F238E27FC236}">
+                <a16:creationId xmlns:a16="http://schemas.microsoft.com/office/drawing/2014/main" id="{2A865FE3-5FC9-4049-87CF-30019C46C0F5}"/>
+              </a:ext>
+              <a:ext uri="{C183D7F6-B498-43B3-948B-1728B52AA6E4}">
+                <adec:decorative xmlns:adec="http://schemas.microsoft.com/office/drawing/2017/decorative" val="1"/>
+              </a:ext>
+            </a:extLst>
+          </p:cNvPr>
+          <p:cNvSpPr>
+            <a:spLocks noGrp="1" noRot="1" noChangeAspect="1" noMove="1" noResize="1" noEditPoints="1" noAdjustHandles="1" noChangeArrowheads="1" noChangeShapeType="1" noTextEdit="1"/>
+          </p:cNvSpPr>
+          <p:nvPr>
+            <p:extLst>
+              <p:ext uri="{386F3935-93C4-4BCD-93E2-E3B085C9AB24}">
+                <p16:designElem xmlns:p16="http://schemas.microsoft.com/office/powerpoint/2015/main" val="1"/>
+              </p:ext>
+            </p:extLst>
+          </p:nvPr>
+        </p:nvSpPr>
+        <p:spPr>
+          <a:xfrm>
+            <a:off x="877458" y="2093976"/>
+            <a:ext cx="5846683" cy="9144"/>
+          </a:xfrm>
+          <a:prstGeom prst="rect">
+            <a:avLst/>
+          </a:prstGeom>
+          <a:solidFill>
+            <a:schemeClr val="tx2">
+              <a:lumMod val="25000"/>
+              <a:lumOff val="75000"/>
+            </a:schemeClr>
+          </a:solidFill>
+          <a:ln w="3175">
+            <a:noFill/>
+          </a:ln>
+          <a:effectLst/>
+        </p:spPr>
+        <p:style>
+          <a:lnRef idx="2">
+            <a:schemeClr val="accent1">
+              <a:shade val="50000"/>
+            </a:schemeClr>
+          </a:lnRef>
+          <a:fillRef idx="1">
+            <a:schemeClr val="accent1"/>
+          </a:fillRef>
+          <a:effectRef idx="0">
+            <a:schemeClr val="accent1"/>
+          </a:effectRef>
+          <a:fontRef idx="minor">
+            <a:schemeClr val="lt1"/>
+          </a:fontRef>
+        </p:style>
+        <p:txBody>
+          <a:bodyPr rtlCol="0" anchor="ctr"/>
+          <a:lstStyle/>
+          <a:p>
+            <a:pPr marL="0" marR="0" lvl="0" indent="0" algn="ctr" defTabSz="914400" rtl="0" eaLnBrk="1" fontAlgn="auto" latinLnBrk="0" hangingPunct="1">
+              <a:lnSpc>
+                <a:spcPct val="100000"/>
+              </a:lnSpc>
+              <a:spcBef>
+                <a:spcPts val="0"/>
+              </a:spcBef>
+              <a:spcAft>
+                <a:spcPts val="0"/>
+              </a:spcAft>
+              <a:buClrTx/>
+              <a:buSzTx/>
+              <a:buFontTx/>
+              <a:buNone/>
+              <a:tabLst/>
+              <a:defRPr/>
+            </a:pPr>
+            <a:endParaRPr kumimoji="0" lang="en-US" sz="1800" b="0" i="0" u="none" strike="noStrike" kern="1200" cap="none" spc="0" normalizeH="0" baseline="0" noProof="0">
+              <a:ln>
+                <a:noFill/>
+              </a:ln>
+              <a:solidFill>
+                <a:prstClr val="white"/>
+              </a:solidFill>
+              <a:effectLst/>
+              <a:uLnTx/>
+              <a:uFillTx/>
+              <a:latin typeface="Calibri" panose="020F0502020204030204"/>
+              <a:ea typeface="+mn-ea"/>
+              <a:cs typeface="+mn-cs"/>
+            </a:endParaRPr>
+          </a:p>
+        </p:txBody>
+      </p:sp>
+      <p:sp>
+        <p:nvSpPr>
           <p:cNvPr id="3" name="Content Placeholder 2">
             <a:extLst>
               <a:ext uri="{FF2B5EF4-FFF2-40B4-BE49-F238E27FC236}">
@@ -6080,27 +7249,127 @@
             <p:ph idx="1"/>
           </p:nvPr>
         </p:nvSpPr>
-        <p:spPr/>
-        <p:txBody>
-          <a:bodyPr/>
-          <a:lstStyle/>
-          <a:p>
-            <a:r>
-              <a:rPr lang="en-NZ" dirty="0"/>
+        <p:spPr>
+          <a:xfrm>
+            <a:off x="841248" y="2252870"/>
+            <a:ext cx="5993892" cy="3560251"/>
+          </a:xfrm>
+        </p:spPr>
+        <p:txBody>
+          <a:bodyPr>
+            <a:normAutofit/>
+          </a:bodyPr>
+          <a:lstStyle/>
+          <a:p>
+            <a:r>
+              <a:rPr lang="en-NZ" sz="1800" dirty="0"/>
               <a:t>At no point ask us to open it </a:t>
             </a:r>
           </a:p>
           <a:p>
             <a:r>
-              <a:rPr lang="en-NZ" dirty="0"/>
-              <a:t>*insert image of inside* JACKK!!!!</a:t>
-            </a:r>
-          </a:p>
-          <a:p>
-            <a:endParaRPr lang="en-NZ" dirty="0"/>
-          </a:p>
-        </p:txBody>
-      </p:sp>
+              <a:rPr lang="en-NZ" sz="1800" dirty="0"/>
+              <a:t>We are 20% sure it won’t explode</a:t>
+            </a:r>
+          </a:p>
+          <a:p>
+            <a:endParaRPr lang="en-NZ" sz="1800" dirty="0"/>
+          </a:p>
+        </p:txBody>
+      </p:sp>
+      <p:pic>
+        <p:nvPicPr>
+          <p:cNvPr id="6" name="Picture 2">
+            <a:extLst>
+              <a:ext uri="{FF2B5EF4-FFF2-40B4-BE49-F238E27FC236}">
+                <a16:creationId xmlns:a16="http://schemas.microsoft.com/office/drawing/2014/main" id="{CAEA4F23-29B5-5E82-A1BA-85AC7C6DC523}"/>
+              </a:ext>
+            </a:extLst>
+          </p:cNvPr>
+          <p:cNvPicPr>
+            <a:picLocks noChangeAspect="1" noChangeArrowheads="1"/>
+          </p:cNvPicPr>
+          <p:nvPr/>
+        </p:nvPicPr>
+        <p:blipFill>
+          <a:blip r:embed="rId2">
+            <a:extLst>
+              <a:ext uri="{28A0092B-C50C-407E-A947-70E740481C1C}">
+                <a14:useLocalDpi xmlns:a14="http://schemas.microsoft.com/office/drawing/2010/main" val="0"/>
+              </a:ext>
+            </a:extLst>
+          </a:blip>
+          <a:stretch>
+            <a:fillRect/>
+          </a:stretch>
+        </p:blipFill>
+        <p:spPr bwMode="auto">
+          <a:xfrm>
+            <a:off x="7679814" y="656012"/>
+            <a:ext cx="4097657" cy="5445391"/>
+          </a:xfrm>
+          <a:prstGeom prst="rect">
+            <a:avLst/>
+          </a:prstGeom>
+          <a:noFill/>
+          <a:extLst>
+            <a:ext uri="{909E8E84-426E-40DD-AFC4-6F175D3DCCD1}">
+              <a14:hiddenFill xmlns:a14="http://schemas.microsoft.com/office/drawing/2010/main">
+                <a:solidFill>
+                  <a:srgbClr val="FFFFFF"/>
+                </a:solidFill>
+              </a14:hiddenFill>
+            </a:ext>
+          </a:extLst>
+        </p:spPr>
+      </p:pic>
+      <p:pic>
+        <p:nvPicPr>
+          <p:cNvPr id="1028" name="Picture 4">
+            <a:extLst>
+              <a:ext uri="{FF2B5EF4-FFF2-40B4-BE49-F238E27FC236}">
+                <a16:creationId xmlns:a16="http://schemas.microsoft.com/office/drawing/2014/main" id="{960BC33C-5ACB-5CD5-B97E-9FAEEE19866E}"/>
+              </a:ext>
+            </a:extLst>
+          </p:cNvPr>
+          <p:cNvPicPr>
+            <a:picLocks noChangeAspect="1" noChangeArrowheads="1"/>
+          </p:cNvPicPr>
+          <p:nvPr/>
+        </p:nvPicPr>
+        <p:blipFill>
+          <a:blip r:embed="rId3">
+            <a:extLst>
+              <a:ext uri="{28A0092B-C50C-407E-A947-70E740481C1C}">
+                <a14:useLocalDpi xmlns:a14="http://schemas.microsoft.com/office/drawing/2010/main" val="0"/>
+              </a:ext>
+            </a:extLst>
+          </a:blip>
+          <a:srcRect/>
+          <a:stretch>
+            <a:fillRect/>
+          </a:stretch>
+        </p:blipFill>
+        <p:spPr bwMode="auto">
+          <a:xfrm>
+            <a:off x="7307907" y="5031748"/>
+            <a:ext cx="4438650" cy="1323975"/>
+          </a:xfrm>
+          <a:prstGeom prst="rect">
+            <a:avLst/>
+          </a:prstGeom>
+          <a:noFill/>
+          <a:extLst>
+            <a:ext uri="{909E8E84-426E-40DD-AFC4-6F175D3DCCD1}">
+              <a14:hiddenFill xmlns:a14="http://schemas.microsoft.com/office/drawing/2010/main">
+                <a:solidFill>
+                  <a:srgbClr val="FFFFFF"/>
+                </a:solidFill>
+              </a14:hiddenFill>
+            </a:ext>
+          </a:extLst>
+        </p:spPr>
+      </p:pic>
     </p:spTree>
     <p:extLst>
       <p:ext uri="{BB962C8B-B14F-4D97-AF65-F5344CB8AC3E}">

</xml_diff>